<commit_message>
relatorio, diagrams now being used, completed catalogs part
</commit_message>
<xml_diff>
--- a/Diagrams.pptx
+++ b/Diagrams.pptx
@@ -8,6 +8,7 @@
     <p:sldId id="256" r:id="rId2"/>
     <p:sldId id="257" r:id="rId3"/>
     <p:sldId id="258" r:id="rId4"/>
+    <p:sldId id="259" r:id="rId5"/>
   </p:sldIdLst>
   <p:sldSz cx="12192000" cy="6858000"/>
   <p:notesSz cx="6858000" cy="9144000"/>
@@ -106,6 +107,11 @@
       </a:defRPr>
     </a:lvl9pPr>
   </p:defaultTextStyle>
+  <p:extLst>
+    <p:ext uri="{EFAFB233-063F-42B5-8137-9DF3F51BA10A}">
+      <p15:sldGuideLst xmlns:p15="http://schemas.microsoft.com/office/powerpoint/2012/main"/>
+    </p:ext>
+  </p:extLst>
 </p:presentation>
 </file>
 
@@ -992,6 +998,13 @@
         </dgm:presLayoutVars>
       </dgm:prSet>
       <dgm:spPr/>
+      <dgm:t>
+        <a:bodyPr/>
+        <a:lstStyle/>
+        <a:p>
+          <a:endParaRPr lang="en-US"/>
+        </a:p>
+      </dgm:t>
     </dgm:pt>
     <dgm:pt modelId="{7CA3FC2D-302A-482C-88E3-0DA624131279}" type="pres">
       <dgm:prSet presAssocID="{C95A0504-2B8D-431B-B21A-BE07FC39CC04}" presName="parentText" presStyleLbl="node1" presStyleIdx="0" presStyleCnt="3">
@@ -1001,6 +1014,13 @@
         </dgm:presLayoutVars>
       </dgm:prSet>
       <dgm:spPr/>
+      <dgm:t>
+        <a:bodyPr/>
+        <a:lstStyle/>
+        <a:p>
+          <a:endParaRPr lang="en-US"/>
+        </a:p>
+      </dgm:t>
     </dgm:pt>
     <dgm:pt modelId="{20122EB4-69F2-49D6-9F1E-052F19A3DC2D}" type="pres">
       <dgm:prSet presAssocID="{718C429E-4186-4D29-992E-6B00EAAA4E00}" presName="spacer" presStyleCnt="0"/>
@@ -1014,6 +1034,13 @@
         </dgm:presLayoutVars>
       </dgm:prSet>
       <dgm:spPr/>
+      <dgm:t>
+        <a:bodyPr/>
+        <a:lstStyle/>
+        <a:p>
+          <a:endParaRPr lang="en-US"/>
+        </a:p>
+      </dgm:t>
     </dgm:pt>
     <dgm:pt modelId="{8D3E17FC-B86C-413F-936A-2062BE321EBD}" type="pres">
       <dgm:prSet presAssocID="{CF4FC572-3587-4FEB-8C00-E419F07CC185}" presName="spacer" presStyleCnt="0"/>
@@ -1027,6 +1054,13 @@
         </dgm:presLayoutVars>
       </dgm:prSet>
       <dgm:spPr/>
+      <dgm:t>
+        <a:bodyPr/>
+        <a:lstStyle/>
+        <a:p>
+          <a:endParaRPr lang="en-US"/>
+        </a:p>
+      </dgm:t>
     </dgm:pt>
   </dgm:ptLst>
   <dgm:cxnLst>
@@ -2631,7 +2665,7 @@
           <a:p>
             <a:fld id="{6443ECDC-A17E-4EE8-BF50-CE49D58A0EFC}" type="datetimeFigureOut">
               <a:rPr lang="en-US" smtClean="0"/>
-              <a:t>4/23/2015</a:t>
+              <a:t>4/24/2015</a:t>
             </a:fld>
             <a:endParaRPr lang="en-US"/>
           </a:p>
@@ -2801,7 +2835,7 @@
           <a:p>
             <a:fld id="{6443ECDC-A17E-4EE8-BF50-CE49D58A0EFC}" type="datetimeFigureOut">
               <a:rPr lang="en-US" smtClean="0"/>
-              <a:t>4/23/2015</a:t>
+              <a:t>4/24/2015</a:t>
             </a:fld>
             <a:endParaRPr lang="en-US"/>
           </a:p>
@@ -2981,7 +3015,7 @@
           <a:p>
             <a:fld id="{6443ECDC-A17E-4EE8-BF50-CE49D58A0EFC}" type="datetimeFigureOut">
               <a:rPr lang="en-US" smtClean="0"/>
-              <a:t>4/23/2015</a:t>
+              <a:t>4/24/2015</a:t>
             </a:fld>
             <a:endParaRPr lang="en-US"/>
           </a:p>
@@ -3151,7 +3185,7 @@
           <a:p>
             <a:fld id="{6443ECDC-A17E-4EE8-BF50-CE49D58A0EFC}" type="datetimeFigureOut">
               <a:rPr lang="en-US" smtClean="0"/>
-              <a:t>4/23/2015</a:t>
+              <a:t>4/24/2015</a:t>
             </a:fld>
             <a:endParaRPr lang="en-US"/>
           </a:p>
@@ -3397,7 +3431,7 @@
           <a:p>
             <a:fld id="{6443ECDC-A17E-4EE8-BF50-CE49D58A0EFC}" type="datetimeFigureOut">
               <a:rPr lang="en-US" smtClean="0"/>
-              <a:t>4/23/2015</a:t>
+              <a:t>4/24/2015</a:t>
             </a:fld>
             <a:endParaRPr lang="en-US"/>
           </a:p>
@@ -3629,7 +3663,7 @@
           <a:p>
             <a:fld id="{6443ECDC-A17E-4EE8-BF50-CE49D58A0EFC}" type="datetimeFigureOut">
               <a:rPr lang="en-US" smtClean="0"/>
-              <a:t>4/23/2015</a:t>
+              <a:t>4/24/2015</a:t>
             </a:fld>
             <a:endParaRPr lang="en-US"/>
           </a:p>
@@ -3996,7 +4030,7 @@
           <a:p>
             <a:fld id="{6443ECDC-A17E-4EE8-BF50-CE49D58A0EFC}" type="datetimeFigureOut">
               <a:rPr lang="en-US" smtClean="0"/>
-              <a:t>4/23/2015</a:t>
+              <a:t>4/24/2015</a:t>
             </a:fld>
             <a:endParaRPr lang="en-US"/>
           </a:p>
@@ -4114,7 +4148,7 @@
           <a:p>
             <a:fld id="{6443ECDC-A17E-4EE8-BF50-CE49D58A0EFC}" type="datetimeFigureOut">
               <a:rPr lang="en-US" smtClean="0"/>
-              <a:t>4/23/2015</a:t>
+              <a:t>4/24/2015</a:t>
             </a:fld>
             <a:endParaRPr lang="en-US"/>
           </a:p>
@@ -4209,7 +4243,7 @@
           <a:p>
             <a:fld id="{6443ECDC-A17E-4EE8-BF50-CE49D58A0EFC}" type="datetimeFigureOut">
               <a:rPr lang="en-US" smtClean="0"/>
-              <a:t>4/23/2015</a:t>
+              <a:t>4/24/2015</a:t>
             </a:fld>
             <a:endParaRPr lang="en-US"/>
           </a:p>
@@ -4486,7 +4520,7 @@
           <a:p>
             <a:fld id="{6443ECDC-A17E-4EE8-BF50-CE49D58A0EFC}" type="datetimeFigureOut">
               <a:rPr lang="en-US" smtClean="0"/>
-              <a:t>4/23/2015</a:t>
+              <a:t>4/24/2015</a:t>
             </a:fld>
             <a:endParaRPr lang="en-US"/>
           </a:p>
@@ -4739,7 +4773,7 @@
           <a:p>
             <a:fld id="{6443ECDC-A17E-4EE8-BF50-CE49D58A0EFC}" type="datetimeFigureOut">
               <a:rPr lang="en-US" smtClean="0"/>
-              <a:t>4/23/2015</a:t>
+              <a:t>4/24/2015</a:t>
             </a:fld>
             <a:endParaRPr lang="en-US"/>
           </a:p>
@@ -4952,7 +4986,7 @@
           <a:p>
             <a:fld id="{6443ECDC-A17E-4EE8-BF50-CE49D58A0EFC}" type="datetimeFigureOut">
               <a:rPr lang="en-US" smtClean="0"/>
-              <a:t>4/23/2015</a:t>
+              <a:t>4/24/2015</a:t>
             </a:fld>
             <a:endParaRPr lang="en-US"/>
           </a:p>
@@ -9008,6 +9042,833 @@
 </p:sld>
 </file>
 
+<file path=ppt/slides/slide4.xml><?xml version="1.0" encoding="utf-8"?>
+<p:sld xmlns:a="http://schemas.openxmlformats.org/drawingml/2006/main" xmlns:r="http://schemas.openxmlformats.org/officeDocument/2006/relationships" xmlns:p="http://schemas.openxmlformats.org/presentationml/2006/main">
+  <p:cSld>
+    <p:spTree>
+      <p:nvGrpSpPr>
+        <p:cNvPr id="1" name=""/>
+        <p:cNvGrpSpPr/>
+        <p:nvPr/>
+      </p:nvGrpSpPr>
+      <p:grpSpPr>
+        <a:xfrm>
+          <a:off x="0" y="0"/>
+          <a:ext cx="0" cy="0"/>
+          <a:chOff x="0" y="0"/>
+          <a:chExt cx="0" cy="0"/>
+        </a:xfrm>
+      </p:grpSpPr>
+      <p:sp>
+        <p:nvSpPr>
+          <p:cNvPr id="23" name="Rectangle 22"/>
+          <p:cNvSpPr/>
+          <p:nvPr/>
+        </p:nvSpPr>
+        <p:spPr>
+          <a:xfrm>
+            <a:off x="594360" y="891540"/>
+            <a:ext cx="4754880" cy="2461260"/>
+          </a:xfrm>
+          <a:prstGeom prst="rect">
+            <a:avLst/>
+          </a:prstGeom>
+          <a:noFill/>
+        </p:spPr>
+        <p:style>
+          <a:lnRef idx="2">
+            <a:schemeClr val="accent1">
+              <a:shade val="50000"/>
+            </a:schemeClr>
+          </a:lnRef>
+          <a:fillRef idx="1">
+            <a:schemeClr val="accent1"/>
+          </a:fillRef>
+          <a:effectRef idx="0">
+            <a:schemeClr val="accent1"/>
+          </a:effectRef>
+          <a:fontRef idx="minor">
+            <a:schemeClr val="lt1"/>
+          </a:fontRef>
+        </p:style>
+        <p:txBody>
+          <a:bodyPr rtlCol="0" anchor="ctr"/>
+          <a:lstStyle/>
+          <a:p>
+            <a:pPr algn="ctr"/>
+            <a:endParaRPr lang="en-US"/>
+          </a:p>
+        </p:txBody>
+      </p:sp>
+      <p:sp>
+        <p:nvSpPr>
+          <p:cNvPr id="24" name="Rectangle 23"/>
+          <p:cNvSpPr/>
+          <p:nvPr/>
+        </p:nvSpPr>
+        <p:spPr>
+          <a:xfrm>
+            <a:off x="594360" y="629053"/>
+            <a:ext cx="1682115" cy="262487"/>
+          </a:xfrm>
+          <a:prstGeom prst="rect">
+            <a:avLst/>
+          </a:prstGeom>
+          <a:noFill/>
+        </p:spPr>
+        <p:style>
+          <a:lnRef idx="2">
+            <a:schemeClr val="accent1">
+              <a:shade val="50000"/>
+            </a:schemeClr>
+          </a:lnRef>
+          <a:fillRef idx="1">
+            <a:schemeClr val="accent1"/>
+          </a:fillRef>
+          <a:effectRef idx="0">
+            <a:schemeClr val="accent1"/>
+          </a:effectRef>
+          <a:fontRef idx="minor">
+            <a:schemeClr val="lt1"/>
+          </a:fontRef>
+        </p:style>
+        <p:txBody>
+          <a:bodyPr rtlCol="0" anchor="ctr"/>
+          <a:lstStyle/>
+          <a:p>
+            <a:pPr algn="ctr"/>
+            <a:endParaRPr lang="en-US"/>
+          </a:p>
+        </p:txBody>
+      </p:sp>
+      <p:sp>
+        <p:nvSpPr>
+          <p:cNvPr id="25" name="Flowchart: Magnetic Disk 24"/>
+          <p:cNvSpPr/>
+          <p:nvPr/>
+        </p:nvSpPr>
+        <p:spPr>
+          <a:xfrm>
+            <a:off x="654050" y="660619"/>
+            <a:ext cx="161314" cy="205740"/>
+          </a:xfrm>
+          <a:prstGeom prst="flowChartMagneticDisk">
+            <a:avLst/>
+          </a:prstGeom>
+        </p:spPr>
+        <p:style>
+          <a:lnRef idx="2">
+            <a:schemeClr val="accent1">
+              <a:shade val="50000"/>
+            </a:schemeClr>
+          </a:lnRef>
+          <a:fillRef idx="1">
+            <a:schemeClr val="accent1"/>
+          </a:fillRef>
+          <a:effectRef idx="0">
+            <a:schemeClr val="accent1"/>
+          </a:effectRef>
+          <a:fontRef idx="minor">
+            <a:schemeClr val="lt1"/>
+          </a:fontRef>
+        </p:style>
+        <p:txBody>
+          <a:bodyPr rtlCol="0" anchor="ctr"/>
+          <a:lstStyle/>
+          <a:p>
+            <a:pPr algn="ctr"/>
+            <a:endParaRPr lang="en-US"/>
+          </a:p>
+        </p:txBody>
+      </p:sp>
+      <p:sp>
+        <p:nvSpPr>
+          <p:cNvPr id="26" name="TextBox 25"/>
+          <p:cNvSpPr txBox="1"/>
+          <p:nvPr/>
+        </p:nvSpPr>
+        <p:spPr>
+          <a:xfrm>
+            <a:off x="815536" y="574600"/>
+            <a:ext cx="1124667" cy="369332"/>
+          </a:xfrm>
+          <a:prstGeom prst="rect">
+            <a:avLst/>
+          </a:prstGeom>
+          <a:noFill/>
+        </p:spPr>
+        <p:txBody>
+          <a:bodyPr wrap="none" rtlCol="0">
+            <a:spAutoFit/>
+          </a:bodyPr>
+          <a:lstStyle/>
+          <a:p>
+            <a:r>
+              <a:rPr lang="en-GB" dirty="0" smtClean="0">
+                <a:solidFill>
+                  <a:schemeClr val="tx2"/>
+                </a:solidFill>
+              </a:rPr>
+              <a:t>GestHiper</a:t>
+            </a:r>
+            <a:endParaRPr lang="en-US" dirty="0">
+              <a:solidFill>
+                <a:schemeClr val="tx2"/>
+              </a:solidFill>
+            </a:endParaRPr>
+          </a:p>
+        </p:txBody>
+      </p:sp>
+      <p:sp>
+        <p:nvSpPr>
+          <p:cNvPr id="42" name="Flowchart: Magnetic Disk 41"/>
+          <p:cNvSpPr/>
+          <p:nvPr/>
+        </p:nvSpPr>
+        <p:spPr>
+          <a:xfrm>
+            <a:off x="1280220" y="2536664"/>
+            <a:ext cx="454025" cy="210344"/>
+          </a:xfrm>
+          <a:prstGeom prst="flowChartMagneticDisk">
+            <a:avLst/>
+          </a:prstGeom>
+          <a:solidFill>
+            <a:srgbClr val="78ACDC"/>
+          </a:solidFill>
+          <a:ln>
+            <a:solidFill>
+              <a:srgbClr val="5D8EBB"/>
+            </a:solidFill>
+          </a:ln>
+        </p:spPr>
+        <p:style>
+          <a:lnRef idx="2">
+            <a:schemeClr val="accent1">
+              <a:shade val="50000"/>
+            </a:schemeClr>
+          </a:lnRef>
+          <a:fillRef idx="1">
+            <a:schemeClr val="accent1"/>
+          </a:fillRef>
+          <a:effectRef idx="0">
+            <a:schemeClr val="accent1"/>
+          </a:effectRef>
+          <a:fontRef idx="minor">
+            <a:schemeClr val="lt1"/>
+          </a:fontRef>
+        </p:style>
+        <p:txBody>
+          <a:bodyPr rtlCol="0" anchor="ctr"/>
+          <a:lstStyle/>
+          <a:p>
+            <a:pPr algn="ctr"/>
+            <a:endParaRPr lang="en-US"/>
+          </a:p>
+        </p:txBody>
+      </p:sp>
+      <p:sp>
+        <p:nvSpPr>
+          <p:cNvPr id="43" name="TextBox 42"/>
+          <p:cNvSpPr txBox="1"/>
+          <p:nvPr/>
+        </p:nvSpPr>
+        <p:spPr>
+          <a:xfrm>
+            <a:off x="1040598" y="2694803"/>
+            <a:ext cx="933269" cy="215444"/>
+          </a:xfrm>
+          <a:prstGeom prst="rect">
+            <a:avLst/>
+          </a:prstGeom>
+          <a:noFill/>
+        </p:spPr>
+        <p:txBody>
+          <a:bodyPr wrap="none" rtlCol="0">
+            <a:spAutoFit/>
+          </a:bodyPr>
+          <a:lstStyle/>
+          <a:p>
+            <a:r>
+              <a:rPr lang="en-GB" sz="800" dirty="0" smtClean="0"/>
+              <a:t>CatálogoProdutos</a:t>
+            </a:r>
+            <a:endParaRPr lang="en-US" sz="800" dirty="0"/>
+          </a:p>
+        </p:txBody>
+      </p:sp>
+      <p:sp>
+        <p:nvSpPr>
+          <p:cNvPr id="44" name="Flowchart: Magnetic Disk 43"/>
+          <p:cNvSpPr/>
+          <p:nvPr/>
+        </p:nvSpPr>
+        <p:spPr>
+          <a:xfrm>
+            <a:off x="2095907" y="2536664"/>
+            <a:ext cx="454025" cy="210344"/>
+          </a:xfrm>
+          <a:prstGeom prst="flowChartMagneticDisk">
+            <a:avLst/>
+          </a:prstGeom>
+          <a:solidFill>
+            <a:srgbClr val="78ACDC"/>
+          </a:solidFill>
+          <a:ln>
+            <a:solidFill>
+              <a:srgbClr val="5D8EBB"/>
+            </a:solidFill>
+          </a:ln>
+        </p:spPr>
+        <p:style>
+          <a:lnRef idx="2">
+            <a:schemeClr val="accent1">
+              <a:shade val="50000"/>
+            </a:schemeClr>
+          </a:lnRef>
+          <a:fillRef idx="1">
+            <a:schemeClr val="accent1"/>
+          </a:fillRef>
+          <a:effectRef idx="0">
+            <a:schemeClr val="accent1"/>
+          </a:effectRef>
+          <a:fontRef idx="minor">
+            <a:schemeClr val="lt1"/>
+          </a:fontRef>
+        </p:style>
+        <p:txBody>
+          <a:bodyPr rtlCol="0" anchor="ctr"/>
+          <a:lstStyle/>
+          <a:p>
+            <a:pPr algn="ctr"/>
+            <a:endParaRPr lang="en-US"/>
+          </a:p>
+        </p:txBody>
+      </p:sp>
+      <p:sp>
+        <p:nvSpPr>
+          <p:cNvPr id="45" name="TextBox 44"/>
+          <p:cNvSpPr txBox="1"/>
+          <p:nvPr/>
+        </p:nvSpPr>
+        <p:spPr>
+          <a:xfrm>
+            <a:off x="1875564" y="2703039"/>
+            <a:ext cx="886781" cy="215444"/>
+          </a:xfrm>
+          <a:prstGeom prst="rect">
+            <a:avLst/>
+          </a:prstGeom>
+          <a:noFill/>
+        </p:spPr>
+        <p:txBody>
+          <a:bodyPr wrap="none" rtlCol="0">
+            <a:spAutoFit/>
+          </a:bodyPr>
+          <a:lstStyle/>
+          <a:p>
+            <a:r>
+              <a:rPr lang="en-GB" sz="800" dirty="0" smtClean="0"/>
+              <a:t>CatálogoClientes</a:t>
+            </a:r>
+            <a:endParaRPr lang="en-US" sz="800" dirty="0"/>
+          </a:p>
+        </p:txBody>
+      </p:sp>
+      <p:sp>
+        <p:nvSpPr>
+          <p:cNvPr id="46" name="Flowchart: Magnetic Disk 45"/>
+          <p:cNvSpPr/>
+          <p:nvPr/>
+        </p:nvSpPr>
+        <p:spPr>
+          <a:xfrm>
+            <a:off x="2953704" y="2536664"/>
+            <a:ext cx="454025" cy="210344"/>
+          </a:xfrm>
+          <a:prstGeom prst="flowChartMagneticDisk">
+            <a:avLst/>
+          </a:prstGeom>
+          <a:solidFill>
+            <a:srgbClr val="78ACDC"/>
+          </a:solidFill>
+          <a:ln>
+            <a:solidFill>
+              <a:srgbClr val="5D8EBB"/>
+            </a:solidFill>
+          </a:ln>
+        </p:spPr>
+        <p:style>
+          <a:lnRef idx="2">
+            <a:schemeClr val="accent1">
+              <a:shade val="50000"/>
+            </a:schemeClr>
+          </a:lnRef>
+          <a:fillRef idx="1">
+            <a:schemeClr val="accent1"/>
+          </a:fillRef>
+          <a:effectRef idx="0">
+            <a:schemeClr val="accent1"/>
+          </a:effectRef>
+          <a:fontRef idx="minor">
+            <a:schemeClr val="lt1"/>
+          </a:fontRef>
+        </p:style>
+        <p:txBody>
+          <a:bodyPr rtlCol="0" anchor="ctr"/>
+          <a:lstStyle/>
+          <a:p>
+            <a:pPr algn="ctr"/>
+            <a:endParaRPr lang="en-US"/>
+          </a:p>
+        </p:txBody>
+      </p:sp>
+      <p:sp>
+        <p:nvSpPr>
+          <p:cNvPr id="47" name="TextBox 46"/>
+          <p:cNvSpPr txBox="1"/>
+          <p:nvPr/>
+        </p:nvSpPr>
+        <p:spPr>
+          <a:xfrm>
+            <a:off x="2903236" y="2703039"/>
+            <a:ext cx="554960" cy="215444"/>
+          </a:xfrm>
+          <a:prstGeom prst="rect">
+            <a:avLst/>
+          </a:prstGeom>
+          <a:noFill/>
+        </p:spPr>
+        <p:txBody>
+          <a:bodyPr wrap="none" rtlCol="0">
+            <a:spAutoFit/>
+          </a:bodyPr>
+          <a:lstStyle/>
+          <a:p>
+            <a:r>
+              <a:rPr lang="en-GB" sz="800" dirty="0" smtClean="0"/>
+              <a:t>Compras</a:t>
+            </a:r>
+            <a:endParaRPr lang="en-US" sz="800" dirty="0"/>
+          </a:p>
+        </p:txBody>
+      </p:sp>
+      <p:sp>
+        <p:nvSpPr>
+          <p:cNvPr id="48" name="Flowchart: Magnetic Disk 47"/>
+          <p:cNvSpPr/>
+          <p:nvPr/>
+        </p:nvSpPr>
+        <p:spPr>
+          <a:xfrm>
+            <a:off x="3790447" y="2528428"/>
+            <a:ext cx="454025" cy="210344"/>
+          </a:xfrm>
+          <a:prstGeom prst="flowChartMagneticDisk">
+            <a:avLst/>
+          </a:prstGeom>
+          <a:solidFill>
+            <a:srgbClr val="78ACDC"/>
+          </a:solidFill>
+          <a:ln>
+            <a:solidFill>
+              <a:srgbClr val="5D8EBB"/>
+            </a:solidFill>
+          </a:ln>
+        </p:spPr>
+        <p:style>
+          <a:lnRef idx="2">
+            <a:schemeClr val="accent1">
+              <a:shade val="50000"/>
+            </a:schemeClr>
+          </a:lnRef>
+          <a:fillRef idx="1">
+            <a:schemeClr val="accent1"/>
+          </a:fillRef>
+          <a:effectRef idx="0">
+            <a:schemeClr val="accent1"/>
+          </a:effectRef>
+          <a:fontRef idx="minor">
+            <a:schemeClr val="lt1"/>
+          </a:fontRef>
+        </p:style>
+        <p:txBody>
+          <a:bodyPr rtlCol="0" anchor="ctr"/>
+          <a:lstStyle/>
+          <a:p>
+            <a:pPr algn="ctr"/>
+            <a:endParaRPr lang="en-US"/>
+          </a:p>
+        </p:txBody>
+      </p:sp>
+      <p:sp>
+        <p:nvSpPr>
+          <p:cNvPr id="49" name="TextBox 48"/>
+          <p:cNvSpPr txBox="1"/>
+          <p:nvPr/>
+        </p:nvSpPr>
+        <p:spPr>
+          <a:xfrm>
+            <a:off x="3633379" y="2694803"/>
+            <a:ext cx="768159" cy="215444"/>
+          </a:xfrm>
+          <a:prstGeom prst="rect">
+            <a:avLst/>
+          </a:prstGeom>
+          <a:noFill/>
+        </p:spPr>
+        <p:txBody>
+          <a:bodyPr wrap="none" rtlCol="0">
+            <a:spAutoFit/>
+          </a:bodyPr>
+          <a:lstStyle/>
+          <a:p>
+            <a:r>
+              <a:rPr lang="en-GB" sz="800" dirty="0" smtClean="0"/>
+              <a:t>Contabilidade</a:t>
+            </a:r>
+            <a:endParaRPr lang="en-US" sz="800" dirty="0"/>
+          </a:p>
+        </p:txBody>
+      </p:sp>
+      <p:cxnSp>
+        <p:nvCxnSpPr>
+          <p:cNvPr id="56" name="Elbow Connector 55"/>
+          <p:cNvCxnSpPr>
+            <a:stCxn id="49" idx="2"/>
+          </p:cNvCxnSpPr>
+          <p:nvPr/>
+        </p:nvCxnSpPr>
+        <p:spPr>
+          <a:xfrm rot="5400000">
+            <a:off x="3479015" y="2611949"/>
+            <a:ext cx="240147" cy="836743"/>
+          </a:xfrm>
+          <a:prstGeom prst="bentConnector2">
+            <a:avLst/>
+          </a:prstGeom>
+        </p:spPr>
+        <p:style>
+          <a:lnRef idx="1">
+            <a:schemeClr val="accent1"/>
+          </a:lnRef>
+          <a:fillRef idx="0">
+            <a:schemeClr val="accent1"/>
+          </a:fillRef>
+          <a:effectRef idx="0">
+            <a:schemeClr val="accent1"/>
+          </a:effectRef>
+          <a:fontRef idx="minor">
+            <a:schemeClr val="tx1"/>
+          </a:fontRef>
+        </p:style>
+      </p:cxnSp>
+      <p:sp>
+        <p:nvSpPr>
+          <p:cNvPr id="58" name="Flowchart: Alternate Process 57"/>
+          <p:cNvSpPr/>
+          <p:nvPr/>
+        </p:nvSpPr>
+        <p:spPr>
+          <a:xfrm>
+            <a:off x="2136985" y="1267861"/>
+            <a:ext cx="1206849" cy="790832"/>
+          </a:xfrm>
+          <a:prstGeom prst="flowChartAlternateProcess">
+            <a:avLst/>
+          </a:prstGeom>
+          <a:solidFill>
+            <a:schemeClr val="accent1"/>
+          </a:solidFill>
+        </p:spPr>
+        <p:style>
+          <a:lnRef idx="2">
+            <a:schemeClr val="accent1">
+              <a:shade val="50000"/>
+            </a:schemeClr>
+          </a:lnRef>
+          <a:fillRef idx="1">
+            <a:schemeClr val="accent1"/>
+          </a:fillRef>
+          <a:effectRef idx="0">
+            <a:schemeClr val="accent1"/>
+          </a:effectRef>
+          <a:fontRef idx="minor">
+            <a:schemeClr val="lt1"/>
+          </a:fontRef>
+        </p:style>
+        <p:txBody>
+          <a:bodyPr rtlCol="0" anchor="ctr"/>
+          <a:lstStyle/>
+          <a:p>
+            <a:pPr algn="ctr"/>
+            <a:r>
+              <a:rPr lang="en-GB" dirty="0" smtClean="0"/>
+              <a:t>main</a:t>
+            </a:r>
+            <a:endParaRPr lang="en-US" dirty="0"/>
+          </a:p>
+        </p:txBody>
+      </p:sp>
+      <p:cxnSp>
+        <p:nvCxnSpPr>
+          <p:cNvPr id="60" name="Elbow Connector 59"/>
+          <p:cNvCxnSpPr>
+            <a:stCxn id="58" idx="2"/>
+            <a:endCxn id="42" idx="1"/>
+          </p:cNvCxnSpPr>
+          <p:nvPr/>
+        </p:nvCxnSpPr>
+        <p:spPr>
+          <a:xfrm rot="5400000">
+            <a:off x="1884837" y="1681090"/>
+            <a:ext cx="477971" cy="1233177"/>
+          </a:xfrm>
+          <a:prstGeom prst="bentConnector3">
+            <a:avLst/>
+          </a:prstGeom>
+          <a:ln>
+            <a:tailEnd type="triangle"/>
+          </a:ln>
+        </p:spPr>
+        <p:style>
+          <a:lnRef idx="1">
+            <a:schemeClr val="accent1"/>
+          </a:lnRef>
+          <a:fillRef idx="0">
+            <a:schemeClr val="accent1"/>
+          </a:fillRef>
+          <a:effectRef idx="0">
+            <a:schemeClr val="accent1"/>
+          </a:effectRef>
+          <a:fontRef idx="minor">
+            <a:schemeClr val="tx1"/>
+          </a:fontRef>
+        </p:style>
+      </p:cxnSp>
+      <p:cxnSp>
+        <p:nvCxnSpPr>
+          <p:cNvPr id="62" name="Elbow Connector 61"/>
+          <p:cNvCxnSpPr>
+            <a:stCxn id="58" idx="2"/>
+            <a:endCxn id="44" idx="1"/>
+          </p:cNvCxnSpPr>
+          <p:nvPr/>
+        </p:nvCxnSpPr>
+        <p:spPr>
+          <a:xfrm rot="5400000">
+            <a:off x="2292680" y="2088933"/>
+            <a:ext cx="477971" cy="417490"/>
+          </a:xfrm>
+          <a:prstGeom prst="bentConnector3">
+            <a:avLst/>
+          </a:prstGeom>
+          <a:ln>
+            <a:tailEnd type="triangle"/>
+          </a:ln>
+        </p:spPr>
+        <p:style>
+          <a:lnRef idx="1">
+            <a:schemeClr val="accent1"/>
+          </a:lnRef>
+          <a:fillRef idx="0">
+            <a:schemeClr val="accent1"/>
+          </a:fillRef>
+          <a:effectRef idx="0">
+            <a:schemeClr val="accent1"/>
+          </a:effectRef>
+          <a:fontRef idx="minor">
+            <a:schemeClr val="tx1"/>
+          </a:fontRef>
+        </p:style>
+      </p:cxnSp>
+      <p:cxnSp>
+        <p:nvCxnSpPr>
+          <p:cNvPr id="64" name="Elbow Connector 63"/>
+          <p:cNvCxnSpPr>
+            <a:stCxn id="58" idx="2"/>
+            <a:endCxn id="46" idx="1"/>
+          </p:cNvCxnSpPr>
+          <p:nvPr/>
+        </p:nvCxnSpPr>
+        <p:spPr>
+          <a:xfrm rot="16200000" flipH="1">
+            <a:off x="2721578" y="2077524"/>
+            <a:ext cx="477971" cy="440307"/>
+          </a:xfrm>
+          <a:prstGeom prst="bentConnector3">
+            <a:avLst/>
+          </a:prstGeom>
+          <a:ln>
+            <a:tailEnd type="triangle"/>
+          </a:ln>
+        </p:spPr>
+        <p:style>
+          <a:lnRef idx="1">
+            <a:schemeClr val="accent1"/>
+          </a:lnRef>
+          <a:fillRef idx="0">
+            <a:schemeClr val="accent1"/>
+          </a:fillRef>
+          <a:effectRef idx="0">
+            <a:schemeClr val="accent1"/>
+          </a:effectRef>
+          <a:fontRef idx="minor">
+            <a:schemeClr val="tx1"/>
+          </a:fontRef>
+        </p:style>
+      </p:cxnSp>
+      <p:cxnSp>
+        <p:nvCxnSpPr>
+          <p:cNvPr id="66" name="Elbow Connector 65"/>
+          <p:cNvCxnSpPr>
+            <a:stCxn id="58" idx="2"/>
+            <a:endCxn id="48" idx="1"/>
+          </p:cNvCxnSpPr>
+          <p:nvPr/>
+        </p:nvCxnSpPr>
+        <p:spPr>
+          <a:xfrm rot="16200000" flipH="1">
+            <a:off x="3144068" y="1655035"/>
+            <a:ext cx="469735" cy="1277050"/>
+          </a:xfrm>
+          <a:prstGeom prst="bentConnector3">
+            <a:avLst/>
+          </a:prstGeom>
+          <a:ln>
+            <a:tailEnd type="triangle"/>
+          </a:ln>
+        </p:spPr>
+        <p:style>
+          <a:lnRef idx="1">
+            <a:schemeClr val="accent1"/>
+          </a:lnRef>
+          <a:fillRef idx="0">
+            <a:schemeClr val="accent1"/>
+          </a:fillRef>
+          <a:effectRef idx="0">
+            <a:schemeClr val="accent1"/>
+          </a:effectRef>
+          <a:fontRef idx="minor">
+            <a:schemeClr val="tx1"/>
+          </a:fontRef>
+        </p:style>
+      </p:cxnSp>
+      <p:cxnSp>
+        <p:nvCxnSpPr>
+          <p:cNvPr id="82" name="Straight Connector 81"/>
+          <p:cNvCxnSpPr>
+            <a:stCxn id="47" idx="2"/>
+          </p:cNvCxnSpPr>
+          <p:nvPr/>
+        </p:nvCxnSpPr>
+        <p:spPr>
+          <a:xfrm>
+            <a:off x="3180716" y="2918483"/>
+            <a:ext cx="0" cy="231911"/>
+          </a:xfrm>
+          <a:prstGeom prst="line">
+            <a:avLst/>
+          </a:prstGeom>
+        </p:spPr>
+        <p:style>
+          <a:lnRef idx="1">
+            <a:schemeClr val="accent1"/>
+          </a:lnRef>
+          <a:fillRef idx="0">
+            <a:schemeClr val="accent1"/>
+          </a:fillRef>
+          <a:effectRef idx="0">
+            <a:schemeClr val="accent1"/>
+          </a:effectRef>
+          <a:fontRef idx="minor">
+            <a:schemeClr val="tx1"/>
+          </a:fontRef>
+        </p:style>
+      </p:cxnSp>
+      <p:cxnSp>
+        <p:nvCxnSpPr>
+          <p:cNvPr id="85" name="Elbow Connector 84"/>
+          <p:cNvCxnSpPr>
+            <a:endCxn id="45" idx="2"/>
+          </p:cNvCxnSpPr>
+          <p:nvPr/>
+        </p:nvCxnSpPr>
+        <p:spPr>
+          <a:xfrm rot="10800000">
+            <a:off x="2318956" y="2918484"/>
+            <a:ext cx="861761" cy="231911"/>
+          </a:xfrm>
+          <a:prstGeom prst="bentConnector2">
+            <a:avLst/>
+          </a:prstGeom>
+          <a:ln>
+            <a:tailEnd type="triangle"/>
+          </a:ln>
+        </p:spPr>
+        <p:style>
+          <a:lnRef idx="1">
+            <a:schemeClr val="accent1"/>
+          </a:lnRef>
+          <a:fillRef idx="0">
+            <a:schemeClr val="accent1"/>
+          </a:fillRef>
+          <a:effectRef idx="0">
+            <a:schemeClr val="accent1"/>
+          </a:effectRef>
+          <a:fontRef idx="minor">
+            <a:schemeClr val="tx1"/>
+          </a:fontRef>
+        </p:style>
+      </p:cxnSp>
+      <p:cxnSp>
+        <p:nvCxnSpPr>
+          <p:cNvPr id="87" name="Elbow Connector 86"/>
+          <p:cNvCxnSpPr>
+            <a:endCxn id="43" idx="2"/>
+          </p:cNvCxnSpPr>
+          <p:nvPr/>
+        </p:nvCxnSpPr>
+        <p:spPr>
+          <a:xfrm rot="10800000">
+            <a:off x="1507234" y="2910248"/>
+            <a:ext cx="811721" cy="240147"/>
+          </a:xfrm>
+          <a:prstGeom prst="bentConnector2">
+            <a:avLst/>
+          </a:prstGeom>
+          <a:ln>
+            <a:tailEnd type="triangle"/>
+          </a:ln>
+        </p:spPr>
+        <p:style>
+          <a:lnRef idx="1">
+            <a:schemeClr val="accent1"/>
+          </a:lnRef>
+          <a:fillRef idx="0">
+            <a:schemeClr val="accent1"/>
+          </a:fillRef>
+          <a:effectRef idx="0">
+            <a:schemeClr val="accent1"/>
+          </a:effectRef>
+          <a:fontRef idx="minor">
+            <a:schemeClr val="tx1"/>
+          </a:fontRef>
+        </p:style>
+      </p:cxnSp>
+    </p:spTree>
+    <p:extLst>
+      <p:ext uri="{BB962C8B-B14F-4D97-AF65-F5344CB8AC3E}">
+        <p14:creationId xmlns:p14="http://schemas.microsoft.com/office/powerpoint/2010/main" val="1620585173"/>
+      </p:ext>
+    </p:extLst>
+  </p:cSld>
+  <p:clrMapOvr>
+    <a:masterClrMapping/>
+  </p:clrMapOvr>
+</p:sld>
+</file>
+
 <file path=ppt/theme/theme1.xml><?xml version="1.0" encoding="utf-8"?>
 <a:theme xmlns:a="http://schemas.openxmlformats.org/drawingml/2006/main" name="Office Theme">
   <a:themeElements>

</xml_diff>